<commit_message>
adicionado minha fala e meu slide para a apresentacao
</commit_message>
<xml_diff>
--- a/Apresentação/Apresentação.pptx
+++ b/Apresentação/Apresentação.pptx
@@ -109,6 +109,11 @@
       </a:defRPr>
     </a:lvl9pPr>
   </p:defaultTextStyle>
+  <p:extLst>
+    <p:ext uri="{EFAFB233-063F-42B5-8137-9DF3F51BA10A}">
+      <p15:sldGuideLst xmlns:p15="http://schemas.microsoft.com/office/powerpoint/2012/main"/>
+    </p:ext>
+  </p:extLst>
 </p:presentation>
 </file>
 
@@ -243,7 +248,7 @@
           <a:p>
             <a:fld id="{5AE921AB-7D81-4E2C-9127-01BE80ED737D}" type="datetimeFigureOut">
               <a:rPr lang="pt-BR" smtClean="0"/>
-              <a:t>24/09/2022</a:t>
+              <a:t>15/10/2022</a:t>
             </a:fld>
             <a:endParaRPr lang="pt-BR"/>
           </a:p>
@@ -413,7 +418,7 @@
           <a:p>
             <a:fld id="{5AE921AB-7D81-4E2C-9127-01BE80ED737D}" type="datetimeFigureOut">
               <a:rPr lang="pt-BR" smtClean="0"/>
-              <a:t>24/09/2022</a:t>
+              <a:t>15/10/2022</a:t>
             </a:fld>
             <a:endParaRPr lang="pt-BR"/>
           </a:p>
@@ -593,7 +598,7 @@
           <a:p>
             <a:fld id="{5AE921AB-7D81-4E2C-9127-01BE80ED737D}" type="datetimeFigureOut">
               <a:rPr lang="pt-BR" smtClean="0"/>
-              <a:t>24/09/2022</a:t>
+              <a:t>15/10/2022</a:t>
             </a:fld>
             <a:endParaRPr lang="pt-BR"/>
           </a:p>
@@ -763,7 +768,7 @@
           <a:p>
             <a:fld id="{5AE921AB-7D81-4E2C-9127-01BE80ED737D}" type="datetimeFigureOut">
               <a:rPr lang="pt-BR" smtClean="0"/>
-              <a:t>24/09/2022</a:t>
+              <a:t>15/10/2022</a:t>
             </a:fld>
             <a:endParaRPr lang="pt-BR"/>
           </a:p>
@@ -1007,7 +1012,7 @@
           <a:p>
             <a:fld id="{5AE921AB-7D81-4E2C-9127-01BE80ED737D}" type="datetimeFigureOut">
               <a:rPr lang="pt-BR" smtClean="0"/>
-              <a:t>24/09/2022</a:t>
+              <a:t>15/10/2022</a:t>
             </a:fld>
             <a:endParaRPr lang="pt-BR"/>
           </a:p>
@@ -1239,7 +1244,7 @@
           <a:p>
             <a:fld id="{5AE921AB-7D81-4E2C-9127-01BE80ED737D}" type="datetimeFigureOut">
               <a:rPr lang="pt-BR" smtClean="0"/>
-              <a:t>24/09/2022</a:t>
+              <a:t>15/10/2022</a:t>
             </a:fld>
             <a:endParaRPr lang="pt-BR"/>
           </a:p>
@@ -1606,7 +1611,7 @@
           <a:p>
             <a:fld id="{5AE921AB-7D81-4E2C-9127-01BE80ED737D}" type="datetimeFigureOut">
               <a:rPr lang="pt-BR" smtClean="0"/>
-              <a:t>24/09/2022</a:t>
+              <a:t>15/10/2022</a:t>
             </a:fld>
             <a:endParaRPr lang="pt-BR"/>
           </a:p>
@@ -1724,7 +1729,7 @@
           <a:p>
             <a:fld id="{5AE921AB-7D81-4E2C-9127-01BE80ED737D}" type="datetimeFigureOut">
               <a:rPr lang="pt-BR" smtClean="0"/>
-              <a:t>24/09/2022</a:t>
+              <a:t>15/10/2022</a:t>
             </a:fld>
             <a:endParaRPr lang="pt-BR"/>
           </a:p>
@@ -1819,7 +1824,7 @@
           <a:p>
             <a:fld id="{5AE921AB-7D81-4E2C-9127-01BE80ED737D}" type="datetimeFigureOut">
               <a:rPr lang="pt-BR" smtClean="0"/>
-              <a:t>24/09/2022</a:t>
+              <a:t>15/10/2022</a:t>
             </a:fld>
             <a:endParaRPr lang="pt-BR"/>
           </a:p>
@@ -2096,7 +2101,7 @@
           <a:p>
             <a:fld id="{5AE921AB-7D81-4E2C-9127-01BE80ED737D}" type="datetimeFigureOut">
               <a:rPr lang="pt-BR" smtClean="0"/>
-              <a:t>24/09/2022</a:t>
+              <a:t>15/10/2022</a:t>
             </a:fld>
             <a:endParaRPr lang="pt-BR"/>
           </a:p>
@@ -2353,7 +2358,7 @@
           <a:p>
             <a:fld id="{5AE921AB-7D81-4E2C-9127-01BE80ED737D}" type="datetimeFigureOut">
               <a:rPr lang="pt-BR" smtClean="0"/>
-              <a:t>24/09/2022</a:t>
+              <a:t>15/10/2022</a:t>
             </a:fld>
             <a:endParaRPr lang="pt-BR"/>
           </a:p>
@@ -2569,7 +2574,7 @@
           <a:p>
             <a:fld id="{5AE921AB-7D81-4E2C-9127-01BE80ED737D}" type="datetimeFigureOut">
               <a:rPr lang="pt-BR" smtClean="0"/>
-              <a:t>24/09/2022</a:t>
+              <a:t>15/10/2022</a:t>
             </a:fld>
             <a:endParaRPr lang="pt-BR"/>
           </a:p>
@@ -3207,7 +3212,14 @@
           <a:bodyPr/>
           <a:lstStyle/>
           <a:p>
-            <a:endParaRPr lang="pt-BR"/>
+            <a:r>
+              <a:rPr lang="pt-BR" dirty="0" smtClean="0"/>
+              <a:t>Problema</a:t>
+            </a:r>
+            <a:br>
+              <a:rPr lang="pt-BR" dirty="0" smtClean="0"/>
+            </a:br>
+            <a:endParaRPr lang="pt-BR" dirty="0"/>
           </a:p>
         </p:txBody>
       </p:sp>
@@ -3232,7 +3244,52 @@
           <a:bodyPr/>
           <a:lstStyle/>
           <a:p>
-            <a:endParaRPr lang="pt-BR"/>
+            <a:r>
+              <a:rPr lang="pt-BR" dirty="0" smtClean="0"/>
+              <a:t>Falta de controle </a:t>
+            </a:r>
+            <a:r>
+              <a:rPr lang="pt-BR" dirty="0" smtClean="0"/>
+              <a:t>n</a:t>
+            </a:r>
+            <a:r>
+              <a:rPr lang="pt-BR" dirty="0" smtClean="0"/>
+              <a:t>a Umidade e Temperatura</a:t>
+            </a:r>
+          </a:p>
+          <a:p>
+            <a:endParaRPr lang="pt-BR" dirty="0"/>
+          </a:p>
+          <a:p>
+            <a:r>
+              <a:rPr lang="pt-BR" dirty="0" smtClean="0"/>
+              <a:t>Temperatura: 25°C á 30°C</a:t>
+            </a:r>
+          </a:p>
+          <a:p>
+            <a:r>
+              <a:rPr lang="pt-BR" dirty="0" smtClean="0"/>
+              <a:t>Umidade: 10% á 12%</a:t>
+            </a:r>
+          </a:p>
+          <a:p>
+            <a:endParaRPr lang="pt-BR" dirty="0" smtClean="0"/>
+          </a:p>
+          <a:p>
+            <a:r>
+              <a:rPr lang="pt-BR" dirty="0" smtClean="0"/>
+              <a:t>Perda de 15% </a:t>
+            </a:r>
+          </a:p>
+          <a:p>
+            <a:endParaRPr lang="pt-BR" dirty="0"/>
+          </a:p>
+          <a:p>
+            <a:r>
+              <a:rPr lang="pt-BR" dirty="0" smtClean="0"/>
+              <a:t>Proliferação e Infestação de Insetos </a:t>
+            </a:r>
+            <a:endParaRPr lang="pt-BR" dirty="0"/>
           </a:p>
         </p:txBody>
       </p:sp>

</xml_diff>

<commit_message>
Atualização arquivos de falas
</commit_message>
<xml_diff>
--- a/Apresentação/Apresentação.pptx
+++ b/Apresentação/Apresentação.pptx
@@ -7,10 +7,11 @@
   <p:sldIdLst>
     <p:sldId id="256" r:id="rId2"/>
     <p:sldId id="257" r:id="rId3"/>
-    <p:sldId id="258" r:id="rId4"/>
-    <p:sldId id="259" r:id="rId5"/>
+    <p:sldId id="259" r:id="rId4"/>
+    <p:sldId id="258" r:id="rId5"/>
     <p:sldId id="260" r:id="rId6"/>
     <p:sldId id="261" r:id="rId7"/>
+    <p:sldId id="262" r:id="rId8"/>
   </p:sldIdLst>
   <p:sldSz cx="9144000" cy="6858000" type="screen4x3"/>
   <p:notesSz cx="6858000" cy="9144000"/>
@@ -3116,7 +3117,7 @@
           <p:cNvPr id="2" name="Título 1">
             <a:extLst>
               <a:ext uri="{FF2B5EF4-FFF2-40B4-BE49-F238E27FC236}">
-                <a16:creationId xmlns:a16="http://schemas.microsoft.com/office/drawing/2014/main" id="{89FFCF15-507E-480E-A33C-640F73B37E0C}"/>
+                <a16:creationId xmlns:a16="http://schemas.microsoft.com/office/drawing/2014/main" id="{75ABACFA-E1FD-41B5-9507-367821336BF7}"/>
               </a:ext>
             </a:extLst>
           </p:cNvPr>
@@ -3132,7 +3133,14 @@
           <a:bodyPr/>
           <a:lstStyle/>
           <a:p>
-            <a:endParaRPr lang="pt-BR"/>
+            <a:r>
+              <a:rPr lang="pt-BR" dirty="0"/>
+              <a:t>Problema</a:t>
+            </a:r>
+            <a:br>
+              <a:rPr lang="pt-BR" dirty="0"/>
+            </a:br>
+            <a:endParaRPr lang="pt-BR" dirty="0"/>
           </a:p>
         </p:txBody>
       </p:sp>
@@ -3141,7 +3149,7 @@
           <p:cNvPr id="3" name="Espaço Reservado para Conteúdo 2">
             <a:extLst>
               <a:ext uri="{FF2B5EF4-FFF2-40B4-BE49-F238E27FC236}">
-                <a16:creationId xmlns:a16="http://schemas.microsoft.com/office/drawing/2014/main" id="{C9EB77E7-20F8-464B-9EF9-56341887AB6A}"/>
+                <a16:creationId xmlns:a16="http://schemas.microsoft.com/office/drawing/2014/main" id="{91070586-5E9C-4129-AFB8-FE2A9848035C}"/>
               </a:ext>
             </a:extLst>
           </p:cNvPr>
@@ -3157,14 +3165,50 @@
           <a:bodyPr/>
           <a:lstStyle/>
           <a:p>
-            <a:endParaRPr lang="pt-BR"/>
+            <a:r>
+              <a:rPr lang="pt-BR" dirty="0"/>
+              <a:t>Falta de controle na Umidade e Temperatura</a:t>
+            </a:r>
+          </a:p>
+          <a:p>
+            <a:endParaRPr lang="pt-BR" dirty="0"/>
+          </a:p>
+          <a:p>
+            <a:r>
+              <a:rPr lang="pt-BR" dirty="0"/>
+              <a:t>Temperatura: 25°C á 30°C</a:t>
+            </a:r>
+          </a:p>
+          <a:p>
+            <a:r>
+              <a:rPr lang="pt-BR" dirty="0"/>
+              <a:t>Umidade: 10% á 12%</a:t>
+            </a:r>
+          </a:p>
+          <a:p>
+            <a:endParaRPr lang="pt-BR" dirty="0"/>
+          </a:p>
+          <a:p>
+            <a:r>
+              <a:rPr lang="pt-BR" dirty="0"/>
+              <a:t>Perda de 15% </a:t>
+            </a:r>
+          </a:p>
+          <a:p>
+            <a:endParaRPr lang="pt-BR" dirty="0"/>
+          </a:p>
+          <a:p>
+            <a:r>
+              <a:rPr lang="pt-BR" dirty="0"/>
+              <a:t>Proliferação e Infestação de Insetos </a:t>
+            </a:r>
           </a:p>
         </p:txBody>
       </p:sp>
     </p:spTree>
     <p:extLst>
       <p:ext uri="{BB962C8B-B14F-4D97-AF65-F5344CB8AC3E}">
-        <p14:creationId xmlns:p14="http://schemas.microsoft.com/office/powerpoint/2010/main" val="3233181933"/>
+        <p14:creationId xmlns:p14="http://schemas.microsoft.com/office/powerpoint/2010/main" val="2723600089"/>
       </p:ext>
     </p:extLst>
   </p:cSld>
@@ -3196,7 +3240,7 @@
           <p:cNvPr id="2" name="Título 1">
             <a:extLst>
               <a:ext uri="{FF2B5EF4-FFF2-40B4-BE49-F238E27FC236}">
-                <a16:creationId xmlns:a16="http://schemas.microsoft.com/office/drawing/2014/main" id="{75ABACFA-E1FD-41B5-9507-367821336BF7}"/>
+                <a16:creationId xmlns:a16="http://schemas.microsoft.com/office/drawing/2014/main" id="{89FFCF15-507E-480E-A33C-640F73B37E0C}"/>
               </a:ext>
             </a:extLst>
           </p:cNvPr>
@@ -3212,14 +3256,7 @@
           <a:bodyPr/>
           <a:lstStyle/>
           <a:p>
-            <a:r>
-              <a:rPr lang="pt-BR" dirty="0" smtClean="0"/>
-              <a:t>Problema</a:t>
-            </a:r>
-            <a:br>
-              <a:rPr lang="pt-BR" dirty="0" smtClean="0"/>
-            </a:br>
-            <a:endParaRPr lang="pt-BR" dirty="0"/>
+            <a:endParaRPr lang="pt-BR"/>
           </a:p>
         </p:txBody>
       </p:sp>
@@ -3228,7 +3265,7 @@
           <p:cNvPr id="3" name="Espaço Reservado para Conteúdo 2">
             <a:extLst>
               <a:ext uri="{FF2B5EF4-FFF2-40B4-BE49-F238E27FC236}">
-                <a16:creationId xmlns:a16="http://schemas.microsoft.com/office/drawing/2014/main" id="{91070586-5E9C-4129-AFB8-FE2A9848035C}"/>
+                <a16:creationId xmlns:a16="http://schemas.microsoft.com/office/drawing/2014/main" id="{C9EB77E7-20F8-464B-9EF9-56341887AB6A}"/>
               </a:ext>
             </a:extLst>
           </p:cNvPr>
@@ -3244,59 +3281,14 @@
           <a:bodyPr/>
           <a:lstStyle/>
           <a:p>
-            <a:r>
-              <a:rPr lang="pt-BR" dirty="0" smtClean="0"/>
-              <a:t>Falta de controle </a:t>
-            </a:r>
-            <a:r>
-              <a:rPr lang="pt-BR" dirty="0" smtClean="0"/>
-              <a:t>n</a:t>
-            </a:r>
-            <a:r>
-              <a:rPr lang="pt-BR" dirty="0" smtClean="0"/>
-              <a:t>a Umidade e Temperatura</a:t>
-            </a:r>
-          </a:p>
-          <a:p>
-            <a:endParaRPr lang="pt-BR" dirty="0"/>
-          </a:p>
-          <a:p>
-            <a:r>
-              <a:rPr lang="pt-BR" dirty="0" smtClean="0"/>
-              <a:t>Temperatura: 25°C á 30°C</a:t>
-            </a:r>
-          </a:p>
-          <a:p>
-            <a:r>
-              <a:rPr lang="pt-BR" dirty="0" smtClean="0"/>
-              <a:t>Umidade: 10% á 12%</a:t>
-            </a:r>
-          </a:p>
-          <a:p>
-            <a:endParaRPr lang="pt-BR" dirty="0" smtClean="0"/>
-          </a:p>
-          <a:p>
-            <a:r>
-              <a:rPr lang="pt-BR" dirty="0" smtClean="0"/>
-              <a:t>Perda de 15% </a:t>
-            </a:r>
-          </a:p>
-          <a:p>
-            <a:endParaRPr lang="pt-BR" dirty="0"/>
-          </a:p>
-          <a:p>
-            <a:r>
-              <a:rPr lang="pt-BR" dirty="0" smtClean="0"/>
-              <a:t>Proliferação e Infestação de Insetos </a:t>
-            </a:r>
-            <a:endParaRPr lang="pt-BR" dirty="0"/>
+            <a:endParaRPr lang="pt-BR"/>
           </a:p>
         </p:txBody>
       </p:sp>
     </p:spTree>
     <p:extLst>
       <p:ext uri="{BB962C8B-B14F-4D97-AF65-F5344CB8AC3E}">
-        <p14:creationId xmlns:p14="http://schemas.microsoft.com/office/powerpoint/2010/main" val="2723600089"/>
+        <p14:creationId xmlns:p14="http://schemas.microsoft.com/office/powerpoint/2010/main" val="3233181933"/>
       </p:ext>
     </p:extLst>
   </p:cSld>
@@ -3457,6 +3449,86 @@
     <p:extLst>
       <p:ext uri="{BB962C8B-B14F-4D97-AF65-F5344CB8AC3E}">
         <p14:creationId xmlns:p14="http://schemas.microsoft.com/office/powerpoint/2010/main" val="4261239994"/>
+      </p:ext>
+    </p:extLst>
+  </p:cSld>
+  <p:clrMapOvr>
+    <a:masterClrMapping/>
+  </p:clrMapOvr>
+</p:sld>
+</file>
+
+<file path=ppt/slides/slide7.xml><?xml version="1.0" encoding="utf-8"?>
+<p:sld xmlns:a="http://schemas.openxmlformats.org/drawingml/2006/main" xmlns:r="http://schemas.openxmlformats.org/officeDocument/2006/relationships" xmlns:p="http://schemas.openxmlformats.org/presentationml/2006/main">
+  <p:cSld>
+    <p:spTree>
+      <p:nvGrpSpPr>
+        <p:cNvPr id="1" name=""/>
+        <p:cNvGrpSpPr/>
+        <p:nvPr/>
+      </p:nvGrpSpPr>
+      <p:grpSpPr>
+        <a:xfrm>
+          <a:off x="0" y="0"/>
+          <a:ext cx="0" cy="0"/>
+          <a:chOff x="0" y="0"/>
+          <a:chExt cx="0" cy="0"/>
+        </a:xfrm>
+      </p:grpSpPr>
+      <p:sp>
+        <p:nvSpPr>
+          <p:cNvPr id="2" name="Título 1">
+            <a:extLst>
+              <a:ext uri="{FF2B5EF4-FFF2-40B4-BE49-F238E27FC236}">
+                <a16:creationId xmlns:a16="http://schemas.microsoft.com/office/drawing/2014/main" id="{9F9E2A87-AACA-4A89-B160-4A4125E4967F}"/>
+              </a:ext>
+            </a:extLst>
+          </p:cNvPr>
+          <p:cNvSpPr>
+            <a:spLocks noGrp="1"/>
+          </p:cNvSpPr>
+          <p:nvPr>
+            <p:ph type="title"/>
+          </p:nvPr>
+        </p:nvSpPr>
+        <p:spPr/>
+        <p:txBody>
+          <a:bodyPr/>
+          <a:lstStyle/>
+          <a:p>
+            <a:endParaRPr lang="pt-BR"/>
+          </a:p>
+        </p:txBody>
+      </p:sp>
+      <p:sp>
+        <p:nvSpPr>
+          <p:cNvPr id="3" name="Espaço Reservado para Conteúdo 2">
+            <a:extLst>
+              <a:ext uri="{FF2B5EF4-FFF2-40B4-BE49-F238E27FC236}">
+                <a16:creationId xmlns:a16="http://schemas.microsoft.com/office/drawing/2014/main" id="{32D3751A-FCFA-4A25-8FB0-3851344F77D0}"/>
+              </a:ext>
+            </a:extLst>
+          </p:cNvPr>
+          <p:cNvSpPr>
+            <a:spLocks noGrp="1"/>
+          </p:cNvSpPr>
+          <p:nvPr>
+            <p:ph idx="1"/>
+          </p:nvPr>
+        </p:nvSpPr>
+        <p:spPr/>
+        <p:txBody>
+          <a:bodyPr/>
+          <a:lstStyle/>
+          <a:p>
+            <a:endParaRPr lang="pt-BR"/>
+          </a:p>
+        </p:txBody>
+      </p:sp>
+    </p:spTree>
+    <p:extLst>
+      <p:ext uri="{BB962C8B-B14F-4D97-AF65-F5344CB8AC3E}">
+        <p14:creationId xmlns:p14="http://schemas.microsoft.com/office/powerpoint/2010/main" val="3326727416"/>
       </p:ext>
     </p:extLst>
   </p:cSld>

</xml_diff>

<commit_message>
add a minha fala da apresentacao e minha parte do ppt
</commit_message>
<xml_diff>
--- a/Apresentação/Apresentação.pptx
+++ b/Apresentação/Apresentação.pptx
@@ -9,8 +9,8 @@
     <p:sldId id="257" r:id="rId3"/>
     <p:sldId id="259" r:id="rId4"/>
     <p:sldId id="258" r:id="rId5"/>
-    <p:sldId id="260" r:id="rId6"/>
-    <p:sldId id="261" r:id="rId7"/>
+    <p:sldId id="263" r:id="rId6"/>
+    <p:sldId id="260" r:id="rId7"/>
     <p:sldId id="262" r:id="rId8"/>
   </p:sldIdLst>
   <p:sldSz cx="9144000" cy="6858000" type="screen4x3"/>
@@ -116,6 +116,143 @@
     </p:ext>
   </p:extLst>
 </p:presentation>
+</file>
+
+<file path=ppt/revisionInfo.xml><?xml version="1.0" encoding="utf-8"?>
+<p1510:revInfo xmlns:a="http://schemas.openxmlformats.org/drawingml/2006/main" xmlns:r="http://schemas.openxmlformats.org/officeDocument/2006/relationships" xmlns:p1510="http://schemas.microsoft.com/office/powerpoint/2015/10/main">
+  <p1510:revLst>
+    <p1510:client id="{AB9C9DD7-8B11-4285-AC7A-C694CE0EA372}" v="49" dt="2022-10-15T22:41:54.214"/>
+  </p1510:revLst>
+</p1510:revInfo>
+</file>
+
+<file path=ppt/changesInfos/changesInfo1.xml><?xml version="1.0" encoding="utf-8"?>
+<pc:chgInfo xmlns:a="http://schemas.openxmlformats.org/drawingml/2006/main" xmlns:r="http://schemas.openxmlformats.org/officeDocument/2006/relationships" xmlns:ac="http://schemas.microsoft.com/office/drawing/2013/main/command" xmlns:pc="http://schemas.microsoft.com/office/powerpoint/2013/main/command">
+  <pc:docChgLst>
+    <pc:chgData name="william kokubun" userId="d4688b2ef84ae56b" providerId="LiveId" clId="{AB9C9DD7-8B11-4285-AC7A-C694CE0EA372}"/>
+    <pc:docChg chg="undo custSel addSld delSld modSld">
+      <pc:chgData name="william kokubun" userId="d4688b2ef84ae56b" providerId="LiveId" clId="{AB9C9DD7-8B11-4285-AC7A-C694CE0EA372}" dt="2022-10-15T22:43:01.840" v="193" actId="1076"/>
+      <pc:docMkLst>
+        <pc:docMk/>
+      </pc:docMkLst>
+      <pc:sldChg chg="addSp delSp modSp mod">
+        <pc:chgData name="william kokubun" userId="d4688b2ef84ae56b" providerId="LiveId" clId="{AB9C9DD7-8B11-4285-AC7A-C694CE0EA372}" dt="2022-10-15T22:42:24.042" v="188" actId="478"/>
+        <pc:sldMkLst>
+          <pc:docMk/>
+          <pc:sldMk cId="2390083590" sldId="257"/>
+        </pc:sldMkLst>
+        <pc:spChg chg="add del mod">
+          <ac:chgData name="william kokubun" userId="d4688b2ef84ae56b" providerId="LiveId" clId="{AB9C9DD7-8B11-4285-AC7A-C694CE0EA372}" dt="2022-10-15T22:42:24.042" v="188" actId="478"/>
+          <ac:spMkLst>
+            <pc:docMk/>
+            <pc:sldMk cId="2390083590" sldId="257"/>
+            <ac:spMk id="2" creationId="{0F9C0662-5DF6-1AC1-6B5C-7EB303F611E6}"/>
+          </ac:spMkLst>
+        </pc:spChg>
+      </pc:sldChg>
+      <pc:sldChg chg="modSp mod">
+        <pc:chgData name="william kokubun" userId="d4688b2ef84ae56b" providerId="LiveId" clId="{AB9C9DD7-8B11-4285-AC7A-C694CE0EA372}" dt="2022-10-15T22:40:40.789" v="174" actId="20577"/>
+        <pc:sldMkLst>
+          <pc:docMk/>
+          <pc:sldMk cId="2723600089" sldId="259"/>
+        </pc:sldMkLst>
+        <pc:spChg chg="mod">
+          <ac:chgData name="william kokubun" userId="d4688b2ef84ae56b" providerId="LiveId" clId="{AB9C9DD7-8B11-4285-AC7A-C694CE0EA372}" dt="2022-10-15T22:40:40.789" v="174" actId="20577"/>
+          <ac:spMkLst>
+            <pc:docMk/>
+            <pc:sldMk cId="2723600089" sldId="259"/>
+            <ac:spMk id="3" creationId="{91070586-5E9C-4129-AFB8-FE2A9848035C}"/>
+          </ac:spMkLst>
+        </pc:spChg>
+      </pc:sldChg>
+      <pc:sldChg chg="addSp delSp modSp mod">
+        <pc:chgData name="william kokubun" userId="d4688b2ef84ae56b" providerId="LiveId" clId="{AB9C9DD7-8B11-4285-AC7A-C694CE0EA372}" dt="2022-10-15T22:43:01.840" v="193" actId="1076"/>
+        <pc:sldMkLst>
+          <pc:docMk/>
+          <pc:sldMk cId="904305974" sldId="260"/>
+        </pc:sldMkLst>
+        <pc:spChg chg="del">
+          <ac:chgData name="william kokubun" userId="d4688b2ef84ae56b" providerId="LiveId" clId="{AB9C9DD7-8B11-4285-AC7A-C694CE0EA372}" dt="2022-10-15T22:38:15.068" v="62" actId="478"/>
+          <ac:spMkLst>
+            <pc:docMk/>
+            <pc:sldMk cId="904305974" sldId="260"/>
+            <ac:spMk id="2" creationId="{C23B0467-23AB-4E98-B42B-BD6AA62D5EE9}"/>
+          </ac:spMkLst>
+        </pc:spChg>
+        <pc:spChg chg="del">
+          <ac:chgData name="william kokubun" userId="d4688b2ef84ae56b" providerId="LiveId" clId="{AB9C9DD7-8B11-4285-AC7A-C694CE0EA372}" dt="2022-10-15T22:37:10.300" v="46" actId="931"/>
+          <ac:spMkLst>
+            <pc:docMk/>
+            <pc:sldMk cId="904305974" sldId="260"/>
+            <ac:spMk id="3" creationId="{D9A787C9-1615-46B0-BF87-31EA44399966}"/>
+          </ac:spMkLst>
+        </pc:spChg>
+        <pc:spChg chg="add del mod">
+          <ac:chgData name="william kokubun" userId="d4688b2ef84ae56b" providerId="LiveId" clId="{AB9C9DD7-8B11-4285-AC7A-C694CE0EA372}" dt="2022-10-15T22:38:16.833" v="63" actId="478"/>
+          <ac:spMkLst>
+            <pc:docMk/>
+            <pc:sldMk cId="904305974" sldId="260"/>
+            <ac:spMk id="8" creationId="{1F376F5C-9098-5C1F-6C00-F9FB47B5225F}"/>
+          </ac:spMkLst>
+        </pc:spChg>
+        <pc:spChg chg="add mod">
+          <ac:chgData name="william kokubun" userId="d4688b2ef84ae56b" providerId="LiveId" clId="{AB9C9DD7-8B11-4285-AC7A-C694CE0EA372}" dt="2022-10-15T22:42:50.653" v="190" actId="1076"/>
+          <ac:spMkLst>
+            <pc:docMk/>
+            <pc:sldMk cId="904305974" sldId="260"/>
+            <ac:spMk id="9" creationId="{75C46533-1D3C-8716-C392-010BDB7D11F2}"/>
+          </ac:spMkLst>
+        </pc:spChg>
+        <pc:picChg chg="add del mod">
+          <ac:chgData name="william kokubun" userId="d4688b2ef84ae56b" providerId="LiveId" clId="{AB9C9DD7-8B11-4285-AC7A-C694CE0EA372}" dt="2022-10-15T22:38:00.833" v="57" actId="478"/>
+          <ac:picMkLst>
+            <pc:docMk/>
+            <pc:sldMk cId="904305974" sldId="260"/>
+            <ac:picMk id="5" creationId="{7B73BFC5-BC8E-7639-0917-169231B4A114}"/>
+          </ac:picMkLst>
+        </pc:picChg>
+        <pc:picChg chg="add del mod modCrop">
+          <ac:chgData name="william kokubun" userId="d4688b2ef84ae56b" providerId="LiveId" clId="{AB9C9DD7-8B11-4285-AC7A-C694CE0EA372}" dt="2022-10-15T22:43:01.840" v="193" actId="1076"/>
+          <ac:picMkLst>
+            <pc:docMk/>
+            <pc:sldMk cId="904305974" sldId="260"/>
+            <ac:picMk id="6" creationId="{01AC4152-EADA-2EDB-77DB-F35E85CDE466}"/>
+          </ac:picMkLst>
+        </pc:picChg>
+      </pc:sldChg>
+      <pc:sldChg chg="addSp delSp modSp del mod">
+        <pc:chgData name="william kokubun" userId="d4688b2ef84ae56b" providerId="LiveId" clId="{AB9C9DD7-8B11-4285-AC7A-C694CE0EA372}" dt="2022-10-15T22:38:31.944" v="65" actId="47"/>
+        <pc:sldMkLst>
+          <pc:docMk/>
+          <pc:sldMk cId="4261239994" sldId="261"/>
+        </pc:sldMkLst>
+        <pc:spChg chg="del">
+          <ac:chgData name="william kokubun" userId="d4688b2ef84ae56b" providerId="LiveId" clId="{AB9C9DD7-8B11-4285-AC7A-C694CE0EA372}" dt="2022-10-15T22:33:50.008" v="0" actId="931"/>
+          <ac:spMkLst>
+            <pc:docMk/>
+            <pc:sldMk cId="4261239994" sldId="261"/>
+            <ac:spMk id="3" creationId="{3E5B85B2-0525-4A00-9460-7450FDE3161B}"/>
+          </ac:spMkLst>
+        </pc:spChg>
+        <pc:picChg chg="add mod">
+          <ac:chgData name="william kokubun" userId="d4688b2ef84ae56b" providerId="LiveId" clId="{AB9C9DD7-8B11-4285-AC7A-C694CE0EA372}" dt="2022-10-15T22:36:29.717" v="45"/>
+          <ac:picMkLst>
+            <pc:docMk/>
+            <pc:sldMk cId="4261239994" sldId="261"/>
+            <ac:picMk id="5" creationId="{0D2CAC6D-4CCE-7746-F668-A99D16E6743F}"/>
+          </ac:picMkLst>
+        </pc:picChg>
+      </pc:sldChg>
+      <pc:sldChg chg="new">
+        <pc:chgData name="william kokubun" userId="d4688b2ef84ae56b" providerId="LiveId" clId="{AB9C9DD7-8B11-4285-AC7A-C694CE0EA372}" dt="2022-10-15T22:38:34.037" v="66" actId="680"/>
+        <pc:sldMkLst>
+          <pc:docMk/>
+          <pc:sldMk cId="461598512" sldId="263"/>
+        </pc:sldMkLst>
+      </pc:sldChg>
+    </pc:docChg>
+  </pc:docChgLst>
+</pc:chgInfo>
 </file>
 
 <file path=ppt/slideLayouts/slideLayout1.xml><?xml version="1.0" encoding="utf-8"?>
@@ -3176,13 +3313,13 @@
           <a:p>
             <a:r>
               <a:rPr lang="pt-BR" dirty="0"/>
-              <a:t>Temperatura: 25°C á 30°C</a:t>
+              <a:t>Temperatura: 25°C à 30°C</a:t>
             </a:r>
           </a:p>
           <a:p>
             <a:r>
               <a:rPr lang="pt-BR" dirty="0"/>
-              <a:t>Umidade: 10% á 12%</a:t>
+              <a:t>Umidade: 10% à 12%</a:t>
             </a:r>
           </a:p>
           <a:p>
@@ -3320,7 +3457,7 @@
           <p:cNvPr id="2" name="Título 1">
             <a:extLst>
               <a:ext uri="{FF2B5EF4-FFF2-40B4-BE49-F238E27FC236}">
-                <a16:creationId xmlns:a16="http://schemas.microsoft.com/office/drawing/2014/main" id="{C23B0467-23AB-4E98-B42B-BD6AA62D5EE9}"/>
+                <a16:creationId xmlns:a16="http://schemas.microsoft.com/office/drawing/2014/main" id="{EB12C9A0-682B-428A-7D32-6611EE27BFD6}"/>
               </a:ext>
             </a:extLst>
           </p:cNvPr>
@@ -3345,7 +3482,7 @@
           <p:cNvPr id="3" name="Espaço Reservado para Conteúdo 2">
             <a:extLst>
               <a:ext uri="{FF2B5EF4-FFF2-40B4-BE49-F238E27FC236}">
-                <a16:creationId xmlns:a16="http://schemas.microsoft.com/office/drawing/2014/main" id="{D9A787C9-1615-46B0-BF87-31EA44399966}"/>
+                <a16:creationId xmlns:a16="http://schemas.microsoft.com/office/drawing/2014/main" id="{937B3FBC-6C03-B462-877F-39D4CA71B510}"/>
               </a:ext>
             </a:extLst>
           </p:cNvPr>
@@ -3368,7 +3505,7 @@
     </p:spTree>
     <p:extLst>
       <p:ext uri="{BB962C8B-B14F-4D97-AF65-F5344CB8AC3E}">
-        <p14:creationId xmlns:p14="http://schemas.microsoft.com/office/powerpoint/2010/main" val="904305974"/>
+        <p14:creationId xmlns:p14="http://schemas.microsoft.com/office/powerpoint/2010/main" val="461598512"/>
       </p:ext>
     </p:extLst>
   </p:cSld>
@@ -3395,60 +3532,78 @@
           <a:chExt cx="0" cy="0"/>
         </a:xfrm>
       </p:grpSpPr>
-      <p:sp>
-        <p:nvSpPr>
-          <p:cNvPr id="2" name="Título 1">
+      <p:pic>
+        <p:nvPicPr>
+          <p:cNvPr id="6" name="Imagem 5">
             <a:extLst>
               <a:ext uri="{FF2B5EF4-FFF2-40B4-BE49-F238E27FC236}">
-                <a16:creationId xmlns:a16="http://schemas.microsoft.com/office/drawing/2014/main" id="{49750606-6FF1-4DFE-9E6A-6697755C471A}"/>
+                <a16:creationId xmlns:a16="http://schemas.microsoft.com/office/drawing/2014/main" id="{01AC4152-EADA-2EDB-77DB-F35E85CDE466}"/>
               </a:ext>
             </a:extLst>
           </p:cNvPr>
-          <p:cNvSpPr>
-            <a:spLocks noGrp="1"/>
-          </p:cNvSpPr>
-          <p:nvPr>
-            <p:ph type="title"/>
-          </p:nvPr>
-        </p:nvSpPr>
-        <p:spPr/>
-        <p:txBody>
-          <a:bodyPr/>
-          <a:lstStyle/>
-          <a:p>
-            <a:endParaRPr lang="pt-BR"/>
-          </a:p>
-        </p:txBody>
-      </p:sp>
-      <p:sp>
-        <p:nvSpPr>
-          <p:cNvPr id="3" name="Espaço Reservado para Conteúdo 2">
+          <p:cNvPicPr>
+            <a:picLocks noChangeAspect="1"/>
+          </p:cNvPicPr>
+          <p:nvPr/>
+        </p:nvPicPr>
+        <p:blipFill rotWithShape="1">
+          <a:blip r:embed="rId2"/>
+          <a:srcRect l="4776" t="9663" r="60597" b="47709"/>
+          <a:stretch/>
+        </p:blipFill>
+        <p:spPr>
+          <a:xfrm>
+            <a:off x="662014" y="810927"/>
+            <a:ext cx="7289289" cy="6283869"/>
+          </a:xfrm>
+          <a:prstGeom prst="rect">
+            <a:avLst/>
+          </a:prstGeom>
+        </p:spPr>
+      </p:pic>
+      <p:sp>
+        <p:nvSpPr>
+          <p:cNvPr id="9" name="CaixaDeTexto 8">
             <a:extLst>
               <a:ext uri="{FF2B5EF4-FFF2-40B4-BE49-F238E27FC236}">
-                <a16:creationId xmlns:a16="http://schemas.microsoft.com/office/drawing/2014/main" id="{3E5B85B2-0525-4A00-9460-7450FDE3161B}"/>
+                <a16:creationId xmlns:a16="http://schemas.microsoft.com/office/drawing/2014/main" id="{75C46533-1D3C-8716-C392-010BDB7D11F2}"/>
               </a:ext>
             </a:extLst>
           </p:cNvPr>
-          <p:cNvSpPr>
-            <a:spLocks noGrp="1"/>
-          </p:cNvSpPr>
-          <p:nvPr>
-            <p:ph idx="1"/>
-          </p:nvPr>
-        </p:nvSpPr>
-        <p:spPr/>
-        <p:txBody>
-          <a:bodyPr/>
-          <a:lstStyle/>
-          <a:p>
-            <a:endParaRPr lang="pt-BR"/>
+          <p:cNvSpPr txBox="1"/>
+          <p:nvPr/>
+        </p:nvSpPr>
+        <p:spPr>
+          <a:xfrm>
+            <a:off x="1019824" y="410817"/>
+            <a:ext cx="7142921" cy="400110"/>
+          </a:xfrm>
+          <a:prstGeom prst="rect">
+            <a:avLst/>
+          </a:prstGeom>
+          <a:noFill/>
+        </p:spPr>
+        <p:txBody>
+          <a:bodyPr wrap="square" rtlCol="0">
+            <a:spAutoFit/>
+          </a:bodyPr>
+          <a:lstStyle/>
+          <a:p>
+            <a:r>
+              <a:rPr lang="pt-BR" sz="2000" b="1" dirty="0">
+                <a:solidFill>
+                  <a:srgbClr val="4F3727"/>
+                </a:solidFill>
+              </a:rPr>
+              <a:t>M.E.R. (Modelo Entidade Relacionamento)– Banco de Dados</a:t>
+            </a:r>
           </a:p>
         </p:txBody>
       </p:sp>
     </p:spTree>
     <p:extLst>
       <p:ext uri="{BB962C8B-B14F-4D97-AF65-F5344CB8AC3E}">
-        <p14:creationId xmlns:p14="http://schemas.microsoft.com/office/powerpoint/2010/main" val="4261239994"/>
+        <p14:creationId xmlns:p14="http://schemas.microsoft.com/office/powerpoint/2010/main" val="904305974"/>
       </p:ext>
     </p:extLst>
   </p:cSld>

</xml_diff>

<commit_message>
Inclusão de slide 4 e 5 (Wallace)
</commit_message>
<xml_diff>
--- a/Apresentação/Apresentação.pptx
+++ b/Apresentação/Apresentação.pptx
@@ -3372,56 +3372,42 @@
           <a:chExt cx="0" cy="0"/>
         </a:xfrm>
       </p:grpSpPr>
-      <p:sp>
-        <p:nvSpPr>
-          <p:cNvPr id="2" name="Título 1">
+      <p:pic>
+        <p:nvPicPr>
+          <p:cNvPr id="5" name="Imagem 4">
             <a:extLst>
               <a:ext uri="{FF2B5EF4-FFF2-40B4-BE49-F238E27FC236}">
-                <a16:creationId xmlns:a16="http://schemas.microsoft.com/office/drawing/2014/main" id="{89FFCF15-507E-480E-A33C-640F73B37E0C}"/>
+                <a16:creationId xmlns:a16="http://schemas.microsoft.com/office/drawing/2014/main" id="{EACEED0F-851C-42BC-AAE5-183C25DC9869}"/>
               </a:ext>
             </a:extLst>
           </p:cNvPr>
-          <p:cNvSpPr>
-            <a:spLocks noGrp="1"/>
-          </p:cNvSpPr>
-          <p:nvPr>
-            <p:ph type="title"/>
-          </p:nvPr>
-        </p:nvSpPr>
-        <p:spPr/>
-        <p:txBody>
-          <a:bodyPr/>
-          <a:lstStyle/>
-          <a:p>
-            <a:endParaRPr lang="pt-BR"/>
-          </a:p>
-        </p:txBody>
-      </p:sp>
-      <p:sp>
-        <p:nvSpPr>
-          <p:cNvPr id="3" name="Espaço Reservado para Conteúdo 2">
+          <p:cNvPicPr>
+            <a:picLocks noChangeAspect="1"/>
+          </p:cNvPicPr>
+          <p:nvPr/>
+        </p:nvPicPr>
+        <p:blipFill>
+          <a:blip r:embed="rId2">
             <a:extLst>
-              <a:ext uri="{FF2B5EF4-FFF2-40B4-BE49-F238E27FC236}">
-                <a16:creationId xmlns:a16="http://schemas.microsoft.com/office/drawing/2014/main" id="{C9EB77E7-20F8-464B-9EF9-56341887AB6A}"/>
+              <a:ext uri="{28A0092B-C50C-407E-A947-70E740481C1C}">
+                <a14:useLocalDpi xmlns:a14="http://schemas.microsoft.com/office/drawing/2010/main" val="0"/>
               </a:ext>
             </a:extLst>
-          </p:cNvPr>
-          <p:cNvSpPr>
-            <a:spLocks noGrp="1"/>
-          </p:cNvSpPr>
-          <p:nvPr>
-            <p:ph idx="1"/>
-          </p:nvPr>
-        </p:nvSpPr>
-        <p:spPr/>
-        <p:txBody>
-          <a:bodyPr/>
-          <a:lstStyle/>
-          <a:p>
-            <a:endParaRPr lang="pt-BR"/>
-          </a:p>
-        </p:txBody>
-      </p:sp>
+          </a:blip>
+          <a:stretch>
+            <a:fillRect/>
+          </a:stretch>
+        </p:blipFill>
+        <p:spPr>
+          <a:xfrm>
+            <a:off x="0" y="0"/>
+            <a:ext cx="9144000" cy="6858000"/>
+          </a:xfrm>
+          <a:prstGeom prst="rect">
+            <a:avLst/>
+          </a:prstGeom>
+        </p:spPr>
+      </p:pic>
     </p:spTree>
     <p:extLst>
       <p:ext uri="{BB962C8B-B14F-4D97-AF65-F5344CB8AC3E}">
@@ -3452,56 +3438,42 @@
           <a:chExt cx="0" cy="0"/>
         </a:xfrm>
       </p:grpSpPr>
-      <p:sp>
-        <p:nvSpPr>
-          <p:cNvPr id="2" name="Título 1">
+      <p:pic>
+        <p:nvPicPr>
+          <p:cNvPr id="5" name="Imagem 4">
             <a:extLst>
               <a:ext uri="{FF2B5EF4-FFF2-40B4-BE49-F238E27FC236}">
-                <a16:creationId xmlns:a16="http://schemas.microsoft.com/office/drawing/2014/main" id="{EB12C9A0-682B-428A-7D32-6611EE27BFD6}"/>
+                <a16:creationId xmlns:a16="http://schemas.microsoft.com/office/drawing/2014/main" id="{A3F64180-284A-4EA4-B17F-2F92F630B785}"/>
               </a:ext>
             </a:extLst>
           </p:cNvPr>
-          <p:cNvSpPr>
-            <a:spLocks noGrp="1"/>
-          </p:cNvSpPr>
-          <p:nvPr>
-            <p:ph type="title"/>
-          </p:nvPr>
-        </p:nvSpPr>
-        <p:spPr/>
-        <p:txBody>
-          <a:bodyPr/>
-          <a:lstStyle/>
-          <a:p>
-            <a:endParaRPr lang="pt-BR"/>
-          </a:p>
-        </p:txBody>
-      </p:sp>
-      <p:sp>
-        <p:nvSpPr>
-          <p:cNvPr id="3" name="Espaço Reservado para Conteúdo 2">
+          <p:cNvPicPr>
+            <a:picLocks noChangeAspect="1"/>
+          </p:cNvPicPr>
+          <p:nvPr/>
+        </p:nvPicPr>
+        <p:blipFill>
+          <a:blip r:embed="rId2">
             <a:extLst>
-              <a:ext uri="{FF2B5EF4-FFF2-40B4-BE49-F238E27FC236}">
-                <a16:creationId xmlns:a16="http://schemas.microsoft.com/office/drawing/2014/main" id="{937B3FBC-6C03-B462-877F-39D4CA71B510}"/>
+              <a:ext uri="{28A0092B-C50C-407E-A947-70E740481C1C}">
+                <a14:useLocalDpi xmlns:a14="http://schemas.microsoft.com/office/drawing/2010/main" val="0"/>
               </a:ext>
             </a:extLst>
-          </p:cNvPr>
-          <p:cNvSpPr>
-            <a:spLocks noGrp="1"/>
-          </p:cNvSpPr>
-          <p:nvPr>
-            <p:ph idx="1"/>
-          </p:nvPr>
-        </p:nvSpPr>
-        <p:spPr/>
-        <p:txBody>
-          <a:bodyPr/>
-          <a:lstStyle/>
-          <a:p>
-            <a:endParaRPr lang="pt-BR"/>
-          </a:p>
-        </p:txBody>
-      </p:sp>
+          </a:blip>
+          <a:stretch>
+            <a:fillRect/>
+          </a:stretch>
+        </p:blipFill>
+        <p:spPr>
+          <a:xfrm>
+            <a:off x="0" y="0"/>
+            <a:ext cx="9144000" cy="6858000"/>
+          </a:xfrm>
+          <a:prstGeom prst="rect">
+            <a:avLst/>
+          </a:prstGeom>
+        </p:spPr>
+      </p:pic>
     </p:spTree>
     <p:extLst>
       <p:ext uri="{BB962C8B-B14F-4D97-AF65-F5344CB8AC3E}">
@@ -3553,7 +3525,7 @@
         </p:blipFill>
         <p:spPr>
           <a:xfrm>
-            <a:off x="662014" y="810927"/>
+            <a:off x="980062" y="810927"/>
             <a:ext cx="7289289" cy="6283869"/>
           </a:xfrm>
           <a:prstGeom prst="rect">
@@ -3575,7 +3547,7 @@
         </p:nvSpPr>
         <p:spPr>
           <a:xfrm>
-            <a:off x="1019824" y="410817"/>
+            <a:off x="1337875" y="410817"/>
             <a:ext cx="7142921" cy="400110"/>
           </a:xfrm>
           <a:prstGeom prst="rect">

</xml_diff>

<commit_message>
Atualização arquivos de falas e power point
</commit_message>
<xml_diff>
--- a/Apresentação/Apresentação.pptx
+++ b/Apresentação/Apresentação.pptx
@@ -10,8 +10,11 @@
     <p:sldId id="259" r:id="rId4"/>
     <p:sldId id="258" r:id="rId5"/>
     <p:sldId id="263" r:id="rId6"/>
-    <p:sldId id="260" r:id="rId7"/>
-    <p:sldId id="262" r:id="rId8"/>
+    <p:sldId id="262" r:id="rId7"/>
+    <p:sldId id="260" r:id="rId8"/>
+    <p:sldId id="264" r:id="rId9"/>
+    <p:sldId id="266" r:id="rId10"/>
+    <p:sldId id="265" r:id="rId11"/>
   </p:sldIdLst>
   <p:sldSz cx="9144000" cy="6858000" type="screen4x3"/>
   <p:notesSz cx="6858000" cy="9144000"/>
@@ -386,7 +389,7 @@
           <a:p>
             <a:fld id="{5AE921AB-7D81-4E2C-9127-01BE80ED737D}" type="datetimeFigureOut">
               <a:rPr lang="pt-BR" smtClean="0"/>
-              <a:t>15/10/2022</a:t>
+              <a:t>16/10/2022</a:t>
             </a:fld>
             <a:endParaRPr lang="pt-BR"/>
           </a:p>
@@ -556,7 +559,7 @@
           <a:p>
             <a:fld id="{5AE921AB-7D81-4E2C-9127-01BE80ED737D}" type="datetimeFigureOut">
               <a:rPr lang="pt-BR" smtClean="0"/>
-              <a:t>15/10/2022</a:t>
+              <a:t>16/10/2022</a:t>
             </a:fld>
             <a:endParaRPr lang="pt-BR"/>
           </a:p>
@@ -736,7 +739,7 @@
           <a:p>
             <a:fld id="{5AE921AB-7D81-4E2C-9127-01BE80ED737D}" type="datetimeFigureOut">
               <a:rPr lang="pt-BR" smtClean="0"/>
-              <a:t>15/10/2022</a:t>
+              <a:t>16/10/2022</a:t>
             </a:fld>
             <a:endParaRPr lang="pt-BR"/>
           </a:p>
@@ -906,7 +909,7 @@
           <a:p>
             <a:fld id="{5AE921AB-7D81-4E2C-9127-01BE80ED737D}" type="datetimeFigureOut">
               <a:rPr lang="pt-BR" smtClean="0"/>
-              <a:t>15/10/2022</a:t>
+              <a:t>16/10/2022</a:t>
             </a:fld>
             <a:endParaRPr lang="pt-BR"/>
           </a:p>
@@ -1150,7 +1153,7 @@
           <a:p>
             <a:fld id="{5AE921AB-7D81-4E2C-9127-01BE80ED737D}" type="datetimeFigureOut">
               <a:rPr lang="pt-BR" smtClean="0"/>
-              <a:t>15/10/2022</a:t>
+              <a:t>16/10/2022</a:t>
             </a:fld>
             <a:endParaRPr lang="pt-BR"/>
           </a:p>
@@ -1382,7 +1385,7 @@
           <a:p>
             <a:fld id="{5AE921AB-7D81-4E2C-9127-01BE80ED737D}" type="datetimeFigureOut">
               <a:rPr lang="pt-BR" smtClean="0"/>
-              <a:t>15/10/2022</a:t>
+              <a:t>16/10/2022</a:t>
             </a:fld>
             <a:endParaRPr lang="pt-BR"/>
           </a:p>
@@ -1749,7 +1752,7 @@
           <a:p>
             <a:fld id="{5AE921AB-7D81-4E2C-9127-01BE80ED737D}" type="datetimeFigureOut">
               <a:rPr lang="pt-BR" smtClean="0"/>
-              <a:t>15/10/2022</a:t>
+              <a:t>16/10/2022</a:t>
             </a:fld>
             <a:endParaRPr lang="pt-BR"/>
           </a:p>
@@ -1867,7 +1870,7 @@
           <a:p>
             <a:fld id="{5AE921AB-7D81-4E2C-9127-01BE80ED737D}" type="datetimeFigureOut">
               <a:rPr lang="pt-BR" smtClean="0"/>
-              <a:t>15/10/2022</a:t>
+              <a:t>16/10/2022</a:t>
             </a:fld>
             <a:endParaRPr lang="pt-BR"/>
           </a:p>
@@ -1962,7 +1965,7 @@
           <a:p>
             <a:fld id="{5AE921AB-7D81-4E2C-9127-01BE80ED737D}" type="datetimeFigureOut">
               <a:rPr lang="pt-BR" smtClean="0"/>
-              <a:t>15/10/2022</a:t>
+              <a:t>16/10/2022</a:t>
             </a:fld>
             <a:endParaRPr lang="pt-BR"/>
           </a:p>
@@ -2239,7 +2242,7 @@
           <a:p>
             <a:fld id="{5AE921AB-7D81-4E2C-9127-01BE80ED737D}" type="datetimeFigureOut">
               <a:rPr lang="pt-BR" smtClean="0"/>
-              <a:t>15/10/2022</a:t>
+              <a:t>16/10/2022</a:t>
             </a:fld>
             <a:endParaRPr lang="pt-BR"/>
           </a:p>
@@ -2496,7 +2499,7 @@
           <a:p>
             <a:fld id="{5AE921AB-7D81-4E2C-9127-01BE80ED737D}" type="datetimeFigureOut">
               <a:rPr lang="pt-BR" smtClean="0"/>
-              <a:t>15/10/2022</a:t>
+              <a:t>16/10/2022</a:t>
             </a:fld>
             <a:endParaRPr lang="pt-BR"/>
           </a:p>
@@ -2712,7 +2715,7 @@
           <a:p>
             <a:fld id="{5AE921AB-7D81-4E2C-9127-01BE80ED737D}" type="datetimeFigureOut">
               <a:rPr lang="pt-BR" smtClean="0"/>
-              <a:t>15/10/2022</a:t>
+              <a:t>16/10/2022</a:t>
             </a:fld>
             <a:endParaRPr lang="pt-BR"/>
           </a:p>
@@ -3166,6 +3169,247 @@
 </p:sld>
 </file>
 
+<file path=ppt/slides/slide10.xml><?xml version="1.0" encoding="utf-8"?>
+<p:sld xmlns:a="http://schemas.openxmlformats.org/drawingml/2006/main" xmlns:r="http://schemas.openxmlformats.org/officeDocument/2006/relationships" xmlns:p="http://schemas.openxmlformats.org/presentationml/2006/main">
+  <p:cSld>
+    <p:bg>
+      <p:bgPr>
+        <a:solidFill>
+          <a:schemeClr val="bg2"/>
+        </a:solidFill>
+        <a:effectLst/>
+      </p:bgPr>
+    </p:bg>
+    <p:spTree>
+      <p:nvGrpSpPr>
+        <p:cNvPr id="1" name=""/>
+        <p:cNvGrpSpPr/>
+        <p:nvPr/>
+      </p:nvGrpSpPr>
+      <p:grpSpPr>
+        <a:xfrm>
+          <a:off x="0" y="0"/>
+          <a:ext cx="0" cy="0"/>
+          <a:chOff x="0" y="0"/>
+          <a:chExt cx="0" cy="0"/>
+        </a:xfrm>
+      </p:grpSpPr>
+      <p:sp>
+        <p:nvSpPr>
+          <p:cNvPr id="4" name="Título 1">
+            <a:extLst>
+              <a:ext uri="{FF2B5EF4-FFF2-40B4-BE49-F238E27FC236}">
+                <a16:creationId xmlns:a16="http://schemas.microsoft.com/office/drawing/2014/main" id="{9B1B4767-F393-45E9-B0FC-EFF4948F6EEB}"/>
+              </a:ext>
+            </a:extLst>
+          </p:cNvPr>
+          <p:cNvSpPr>
+            <a:spLocks noGrp="1"/>
+          </p:cNvSpPr>
+          <p:nvPr>
+            <p:ph type="title"/>
+          </p:nvPr>
+        </p:nvSpPr>
+        <p:spPr>
+          <a:xfrm>
+            <a:off x="487836" y="4559523"/>
+            <a:ext cx="8176104" cy="1236440"/>
+          </a:xfrm>
+          <a:noFill/>
+        </p:spPr>
+        <p:txBody>
+          <a:bodyPr vert="horz" lIns="91440" tIns="45720" rIns="91440" bIns="45720" rtlCol="0" anchor="b">
+            <a:normAutofit/>
+          </a:bodyPr>
+          <a:lstStyle/>
+          <a:p>
+            <a:pPr algn="ctr"/>
+            <a:r>
+              <a:rPr lang="en-US" sz="5700"/>
+              <a:t>Obrigado a todos!</a:t>
+            </a:r>
+          </a:p>
+        </p:txBody>
+      </p:sp>
+      <p:sp>
+        <p:nvSpPr>
+          <p:cNvPr id="5" name="Espaço Reservado para Conteúdo 2">
+            <a:extLst>
+              <a:ext uri="{FF2B5EF4-FFF2-40B4-BE49-F238E27FC236}">
+                <a16:creationId xmlns:a16="http://schemas.microsoft.com/office/drawing/2014/main" id="{6F086EED-159E-492E-9710-E7BEBF55D8FE}"/>
+              </a:ext>
+            </a:extLst>
+          </p:cNvPr>
+          <p:cNvSpPr>
+            <a:spLocks noGrp="1"/>
+          </p:cNvSpPr>
+          <p:nvPr>
+            <p:ph idx="1"/>
+          </p:nvPr>
+        </p:nvSpPr>
+        <p:spPr>
+          <a:xfrm>
+            <a:off x="487836" y="5795963"/>
+            <a:ext cx="8176104" cy="560388"/>
+          </a:xfrm>
+          <a:noFill/>
+        </p:spPr>
+        <p:txBody>
+          <a:bodyPr vert="horz" lIns="91440" tIns="45720" rIns="91440" bIns="45720" rtlCol="0">
+            <a:normAutofit/>
+          </a:bodyPr>
+          <a:lstStyle/>
+          <a:p>
+            <a:pPr marL="0" indent="0" algn="ctr">
+              <a:buNone/>
+            </a:pPr>
+            <a:r>
+              <a:rPr lang="en-US" sz="2400"/>
+              <a:t>Alguma dúvida?</a:t>
+            </a:r>
+          </a:p>
+        </p:txBody>
+      </p:sp>
+      <p:pic>
+        <p:nvPicPr>
+          <p:cNvPr id="6" name="Imagem 5" descr="Uma imagem contendo mesa, comida, pilha, chocolate&#10;&#10;Descrição gerada automaticamente">
+            <a:extLst>
+              <a:ext uri="{FF2B5EF4-FFF2-40B4-BE49-F238E27FC236}">
+                <a16:creationId xmlns:a16="http://schemas.microsoft.com/office/drawing/2014/main" id="{371A0154-0897-4FDB-8E5E-9947307AC1DE}"/>
+              </a:ext>
+            </a:extLst>
+          </p:cNvPr>
+          <p:cNvPicPr>
+            <a:picLocks noChangeAspect="1"/>
+          </p:cNvPicPr>
+          <p:nvPr/>
+        </p:nvPicPr>
+        <p:blipFill rotWithShape="1">
+          <a:blip r:embed="rId2">
+            <a:extLst>
+              <a:ext uri="{28A0092B-C50C-407E-A947-70E740481C1C}">
+                <a14:useLocalDpi xmlns:a14="http://schemas.microsoft.com/office/drawing/2010/main" val="0"/>
+              </a:ext>
+            </a:extLst>
+          </a:blip>
+          <a:srcRect t="5380"/>
+          <a:stretch/>
+        </p:blipFill>
+        <p:spPr>
+          <a:xfrm>
+            <a:off x="20" y="1"/>
+            <a:ext cx="9143979" cy="4239482"/>
+          </a:xfrm>
+          <a:prstGeom prst="rect">
+            <a:avLst/>
+          </a:prstGeom>
+        </p:spPr>
+      </p:pic>
+    </p:spTree>
+    <p:extLst>
+      <p:ext uri="{BB962C8B-B14F-4D97-AF65-F5344CB8AC3E}">
+        <p14:creationId xmlns:p14="http://schemas.microsoft.com/office/powerpoint/2010/main" val="1705555642"/>
+      </p:ext>
+    </p:extLst>
+  </p:cSld>
+  <p:clrMapOvr>
+    <a:masterClrMapping/>
+  </p:clrMapOvr>
+  <p:timing>
+    <p:tnLst>
+      <p:par>
+        <p:cTn id="1" dur="indefinite" restart="never" nodeType="tmRoot">
+          <p:childTnLst>
+            <p:seq concurrent="1" nextAc="seek">
+              <p:cTn id="2" dur="indefinite" nodeType="mainSeq">
+                <p:childTnLst>
+                  <p:par>
+                    <p:cTn id="3" fill="hold">
+                      <p:stCondLst>
+                        <p:cond delay="indefinite"/>
+                        <p:cond evt="onBegin" delay="0">
+                          <p:tn val="2"/>
+                        </p:cond>
+                      </p:stCondLst>
+                      <p:childTnLst>
+                        <p:par>
+                          <p:cTn id="4" fill="hold">
+                            <p:stCondLst>
+                              <p:cond delay="0"/>
+                            </p:stCondLst>
+                            <p:childTnLst>
+                              <p:par>
+                                <p:cTn id="5" presetID="10" presetClass="entr" presetSubtype="0" fill="hold" grpId="0" nodeType="withEffect">
+                                  <p:stCondLst>
+                                    <p:cond delay="1000"/>
+                                  </p:stCondLst>
+                                  <p:iterate type="lt">
+                                    <p:tmPct val="10000"/>
+                                  </p:iterate>
+                                  <p:childTnLst>
+                                    <p:set>
+                                      <p:cBhvr>
+                                        <p:cTn id="6" dur="1" fill="hold">
+                                          <p:stCondLst>
+                                            <p:cond delay="0"/>
+                                          </p:stCondLst>
+                                        </p:cTn>
+                                        <p:tgtEl>
+                                          <p:spTgt spid="4"/>
+                                        </p:tgtEl>
+                                        <p:attrNameLst>
+                                          <p:attrName>style.visibility</p:attrName>
+                                        </p:attrNameLst>
+                                      </p:cBhvr>
+                                      <p:to>
+                                        <p:strVal val="visible"/>
+                                      </p:to>
+                                    </p:set>
+                                    <p:animEffect transition="in" filter="fade">
+                                      <p:cBhvr>
+                                        <p:cTn id="7" dur="400"/>
+                                        <p:tgtEl>
+                                          <p:spTgt spid="4"/>
+                                        </p:tgtEl>
+                                      </p:cBhvr>
+                                    </p:animEffect>
+                                  </p:childTnLst>
+                                </p:cTn>
+                              </p:par>
+                            </p:childTnLst>
+                          </p:cTn>
+                        </p:par>
+                      </p:childTnLst>
+                    </p:cTn>
+                  </p:par>
+                </p:childTnLst>
+              </p:cTn>
+              <p:prevCondLst>
+                <p:cond evt="onPrev" delay="0">
+                  <p:tgtEl>
+                    <p:sldTgt/>
+                  </p:tgtEl>
+                </p:cond>
+              </p:prevCondLst>
+              <p:nextCondLst>
+                <p:cond evt="onNext" delay="0">
+                  <p:tgtEl>
+                    <p:sldTgt/>
+                  </p:tgtEl>
+                </p:cond>
+              </p:nextCondLst>
+            </p:seq>
+          </p:childTnLst>
+        </p:cTn>
+      </p:par>
+    </p:tnLst>
+    <p:bldLst>
+      <p:bldP spid="4" grpId="0"/>
+    </p:bldLst>
+  </p:timing>
+</p:sld>
+</file>
+
 <file path=ppt/slides/slide2.xml><?xml version="1.0" encoding="utf-8"?>
 <p:sld xmlns:a="http://schemas.openxmlformats.org/drawingml/2006/main" xmlns:r="http://schemas.openxmlformats.org/officeDocument/2006/relationships" xmlns:p="http://schemas.openxmlformats.org/presentationml/2006/main">
   <p:cSld>
@@ -3490,6 +3734,118 @@
 <file path=ppt/slides/slide6.xml><?xml version="1.0" encoding="utf-8"?>
 <p:sld xmlns:a="http://schemas.openxmlformats.org/drawingml/2006/main" xmlns:r="http://schemas.openxmlformats.org/officeDocument/2006/relationships" xmlns:p="http://schemas.openxmlformats.org/presentationml/2006/main">
   <p:cSld>
+    <p:bg>
+      <p:bgPr>
+        <a:solidFill>
+          <a:schemeClr val="bg1"/>
+        </a:solidFill>
+        <a:effectLst/>
+      </p:bgPr>
+    </p:bg>
+    <p:spTree>
+      <p:nvGrpSpPr>
+        <p:cNvPr id="1" name=""/>
+        <p:cNvGrpSpPr/>
+        <p:nvPr/>
+      </p:nvGrpSpPr>
+      <p:grpSpPr>
+        <a:xfrm>
+          <a:off x="0" y="0"/>
+          <a:ext cx="0" cy="0"/>
+          <a:chOff x="0" y="0"/>
+          <a:chExt cx="0" cy="0"/>
+        </a:xfrm>
+      </p:grpSpPr>
+      <p:sp>
+        <p:nvSpPr>
+          <p:cNvPr id="4" name="Título 1">
+            <a:extLst>
+              <a:ext uri="{FF2B5EF4-FFF2-40B4-BE49-F238E27FC236}">
+                <a16:creationId xmlns:a16="http://schemas.microsoft.com/office/drawing/2014/main" id="{5870A819-7932-4E1C-B2E8-6B8E08323A7A}"/>
+              </a:ext>
+            </a:extLst>
+          </p:cNvPr>
+          <p:cNvSpPr>
+            <a:spLocks noGrp="1"/>
+          </p:cNvSpPr>
+          <p:nvPr>
+            <p:ph type="title"/>
+          </p:nvPr>
+        </p:nvSpPr>
+        <p:spPr>
+          <a:xfrm>
+            <a:off x="628649" y="291090"/>
+            <a:ext cx="7886699" cy="932688"/>
+          </a:xfrm>
+        </p:spPr>
+        <p:txBody>
+          <a:bodyPr vert="horz" lIns="91440" tIns="45720" rIns="91440" bIns="45720" rtlCol="0" anchor="b">
+            <a:normAutofit/>
+          </a:bodyPr>
+          <a:lstStyle/>
+          <a:p>
+            <a:r>
+              <a:rPr lang="en-US" sz="4700" kern="1200">
+                <a:solidFill>
+                  <a:schemeClr val="tx1"/>
+                </a:solidFill>
+                <a:latin typeface="+mj-lt"/>
+                <a:ea typeface="+mj-ea"/>
+                <a:cs typeface="+mj-cs"/>
+              </a:rPr>
+              <a:t>Diagrama de solução técnico</a:t>
+            </a:r>
+          </a:p>
+        </p:txBody>
+      </p:sp>
+      <p:pic>
+        <p:nvPicPr>
+          <p:cNvPr id="5" name="Espaço Reservado para Conteúdo 8">
+            <a:extLst>
+              <a:ext uri="{FF2B5EF4-FFF2-40B4-BE49-F238E27FC236}">
+                <a16:creationId xmlns:a16="http://schemas.microsoft.com/office/drawing/2014/main" id="{67A09C1E-F36B-4BFE-9474-265E2B0E3E16}"/>
+              </a:ext>
+            </a:extLst>
+          </p:cNvPr>
+          <p:cNvPicPr>
+            <a:picLocks noGrp="1" noChangeAspect="1"/>
+          </p:cNvPicPr>
+          <p:nvPr>
+            <p:ph idx="1"/>
+          </p:nvPr>
+        </p:nvPicPr>
+        <p:blipFill>
+          <a:blip r:embed="rId2"/>
+          <a:stretch>
+            <a:fillRect/>
+          </a:stretch>
+        </p:blipFill>
+        <p:spPr>
+          <a:xfrm>
+            <a:off x="0" y="1538103"/>
+            <a:ext cx="9100042" cy="4662672"/>
+          </a:xfrm>
+          <a:prstGeom prst="rect">
+            <a:avLst/>
+          </a:prstGeom>
+        </p:spPr>
+      </p:pic>
+    </p:spTree>
+    <p:extLst>
+      <p:ext uri="{BB962C8B-B14F-4D97-AF65-F5344CB8AC3E}">
+        <p14:creationId xmlns:p14="http://schemas.microsoft.com/office/powerpoint/2010/main" val="3326727416"/>
+      </p:ext>
+    </p:extLst>
+  </p:cSld>
+  <p:clrMapOvr>
+    <a:masterClrMapping/>
+  </p:clrMapOvr>
+</p:sld>
+</file>
+
+<file path=ppt/slides/slide7.xml><?xml version="1.0" encoding="utf-8"?>
+<p:sld xmlns:a="http://schemas.openxmlformats.org/drawingml/2006/main" xmlns:r="http://schemas.openxmlformats.org/officeDocument/2006/relationships" xmlns:p="http://schemas.openxmlformats.org/presentationml/2006/main">
+  <p:cSld>
     <p:spTree>
       <p:nvGrpSpPr>
         <p:cNvPr id="1" name=""/>
@@ -3585,9 +3941,17 @@
 </p:sld>
 </file>
 
-<file path=ppt/slides/slide7.xml><?xml version="1.0" encoding="utf-8"?>
+<file path=ppt/slides/slide8.xml><?xml version="1.0" encoding="utf-8"?>
 <p:sld xmlns:a="http://schemas.openxmlformats.org/drawingml/2006/main" xmlns:r="http://schemas.openxmlformats.org/officeDocument/2006/relationships" xmlns:p="http://schemas.openxmlformats.org/presentationml/2006/main">
   <p:cSld>
+    <p:bg>
+      <p:bgPr>
+        <a:solidFill>
+          <a:schemeClr val="bg1"/>
+        </a:solidFill>
+        <a:effectLst/>
+      </p:bgPr>
+    </p:bg>
     <p:spTree>
       <p:nvGrpSpPr>
         <p:cNvPr id="1" name=""/>
@@ -3604,10 +3968,10 @@
       </p:grpSpPr>
       <p:sp>
         <p:nvSpPr>
-          <p:cNvPr id="2" name="Título 1">
+          <p:cNvPr id="4" name="Título 1">
             <a:extLst>
               <a:ext uri="{FF2B5EF4-FFF2-40B4-BE49-F238E27FC236}">
-                <a16:creationId xmlns:a16="http://schemas.microsoft.com/office/drawing/2014/main" id="{9F9E2A87-AACA-4A89-B160-4A4125E4967F}"/>
+                <a16:creationId xmlns:a16="http://schemas.microsoft.com/office/drawing/2014/main" id="{F3353A14-75BA-4675-913E-F8689E0B6AE0}"/>
               </a:ext>
             </a:extLst>
           </p:cNvPr>
@@ -3618,44 +3982,269 @@
             <p:ph type="title"/>
           </p:nvPr>
         </p:nvSpPr>
-        <p:spPr/>
-        <p:txBody>
-          <a:bodyPr/>
-          <a:lstStyle/>
-          <a:p>
-            <a:endParaRPr lang="pt-BR"/>
-          </a:p>
-        </p:txBody>
-      </p:sp>
-      <p:sp>
-        <p:nvSpPr>
-          <p:cNvPr id="3" name="Espaço Reservado para Conteúdo 2">
+        <p:spPr>
+          <a:xfrm>
+            <a:off x="628649" y="291090"/>
+            <a:ext cx="7886699" cy="932688"/>
+          </a:xfrm>
+        </p:spPr>
+        <p:txBody>
+          <a:bodyPr vert="horz" lIns="91440" tIns="45720" rIns="91440" bIns="45720" rtlCol="0" anchor="b">
+            <a:normAutofit/>
+          </a:bodyPr>
+          <a:lstStyle/>
+          <a:p>
+            <a:r>
+              <a:rPr lang="en-US" sz="4700" kern="1200">
+                <a:solidFill>
+                  <a:schemeClr val="tx1"/>
+                </a:solidFill>
+                <a:latin typeface="+mj-lt"/>
+                <a:ea typeface="+mj-ea"/>
+                <a:cs typeface="+mj-cs"/>
+              </a:rPr>
+              <a:t>Diagrama de visão de negócio</a:t>
+            </a:r>
+          </a:p>
+        </p:txBody>
+      </p:sp>
+      <p:pic>
+        <p:nvPicPr>
+          <p:cNvPr id="5" name="Espaço Reservado para Conteúdo 4">
             <a:extLst>
               <a:ext uri="{FF2B5EF4-FFF2-40B4-BE49-F238E27FC236}">
-                <a16:creationId xmlns:a16="http://schemas.microsoft.com/office/drawing/2014/main" id="{32D3751A-FCFA-4A25-8FB0-3851344F77D0}"/>
+                <a16:creationId xmlns:a16="http://schemas.microsoft.com/office/drawing/2014/main" id="{28019C2A-F1B6-451F-B1B2-42AB1A736A90}"/>
               </a:ext>
             </a:extLst>
           </p:cNvPr>
-          <p:cNvSpPr>
-            <a:spLocks noGrp="1"/>
-          </p:cNvSpPr>
+          <p:cNvPicPr>
+            <a:picLocks noGrp="1" noChangeAspect="1"/>
+          </p:cNvPicPr>
           <p:nvPr>
             <p:ph idx="1"/>
           </p:nvPr>
-        </p:nvSpPr>
-        <p:spPr/>
-        <p:txBody>
-          <a:bodyPr/>
-          <a:lstStyle/>
-          <a:p>
-            <a:endParaRPr lang="pt-BR"/>
-          </a:p>
-        </p:txBody>
-      </p:sp>
+        </p:nvPicPr>
+        <p:blipFill>
+          <a:blip r:embed="rId2"/>
+          <a:stretch>
+            <a:fillRect/>
+          </a:stretch>
+        </p:blipFill>
+        <p:spPr>
+          <a:xfrm>
+            <a:off x="374254" y="1223778"/>
+            <a:ext cx="8141094" cy="5504047"/>
+          </a:xfrm>
+          <a:prstGeom prst="rect">
+            <a:avLst/>
+          </a:prstGeom>
+        </p:spPr>
+      </p:pic>
     </p:spTree>
     <p:extLst>
       <p:ext uri="{BB962C8B-B14F-4D97-AF65-F5344CB8AC3E}">
-        <p14:creationId xmlns:p14="http://schemas.microsoft.com/office/powerpoint/2010/main" val="3326727416"/>
+        <p14:creationId xmlns:p14="http://schemas.microsoft.com/office/powerpoint/2010/main" val="1356666459"/>
+      </p:ext>
+    </p:extLst>
+  </p:cSld>
+  <p:clrMapOvr>
+    <a:masterClrMapping/>
+  </p:clrMapOvr>
+</p:sld>
+</file>
+
+<file path=ppt/slides/slide9.xml><?xml version="1.0" encoding="utf-8"?>
+<p:sld xmlns:a="http://schemas.openxmlformats.org/drawingml/2006/main" xmlns:r="http://schemas.openxmlformats.org/officeDocument/2006/relationships" xmlns:p="http://schemas.openxmlformats.org/presentationml/2006/main">
+  <p:cSld>
+    <p:bg>
+      <p:bgPr>
+        <a:solidFill>
+          <a:schemeClr val="bg1"/>
+        </a:solidFill>
+        <a:effectLst/>
+      </p:bgPr>
+    </p:bg>
+    <p:spTree>
+      <p:nvGrpSpPr>
+        <p:cNvPr id="1" name=""/>
+        <p:cNvGrpSpPr/>
+        <p:nvPr/>
+      </p:nvGrpSpPr>
+      <p:grpSpPr>
+        <a:xfrm>
+          <a:off x="0" y="0"/>
+          <a:ext cx="0" cy="0"/>
+          <a:chOff x="0" y="0"/>
+          <a:chExt cx="0" cy="0"/>
+        </a:xfrm>
+      </p:grpSpPr>
+      <p:sp useBgFill="1">
+        <p:nvSpPr>
+          <p:cNvPr id="4" name="Rectangle 9">
+            <a:extLst>
+              <a:ext uri="{FF2B5EF4-FFF2-40B4-BE49-F238E27FC236}">
+                <a16:creationId xmlns:a16="http://schemas.microsoft.com/office/drawing/2014/main" id="{D97412AC-216E-4388-926B-11C7DAEFF9D8}"/>
+              </a:ext>
+              <a:ext uri="{C183D7F6-B498-43B3-948B-1728B52AA6E4}">
+                <adec:decorative xmlns:adec="http://schemas.microsoft.com/office/drawing/2017/decorative" val="1"/>
+              </a:ext>
+            </a:extLst>
+          </p:cNvPr>
+          <p:cNvSpPr>
+            <a:spLocks noGrp="1" noRot="1" noChangeAspect="1" noMove="1" noResize="1" noEditPoints="1" noAdjustHandles="1" noChangeArrowheads="1" noChangeShapeType="1" noTextEdit="1"/>
+          </p:cNvSpPr>
+          <p:nvPr>
+            <p:extLst>
+              <p:ext uri="{386F3935-93C4-4BCD-93E2-E3B085C9AB24}">
+                <p16:designElem xmlns:p16="http://schemas.microsoft.com/office/powerpoint/2015/main" val="1"/>
+              </p:ext>
+            </p:extLst>
+          </p:nvPr>
+        </p:nvSpPr>
+        <p:spPr>
+          <a:xfrm>
+            <a:off x="0" y="0"/>
+            <a:ext cx="9141714" cy="6858000"/>
+          </a:xfrm>
+          <a:prstGeom prst="rect">
+            <a:avLst/>
+          </a:prstGeom>
+          <a:ln>
+            <a:noFill/>
+          </a:ln>
+        </p:spPr>
+        <p:style>
+          <a:lnRef idx="2">
+            <a:schemeClr val="accent1">
+              <a:shade val="50000"/>
+            </a:schemeClr>
+          </a:lnRef>
+          <a:fillRef idx="1">
+            <a:schemeClr val="accent1"/>
+          </a:fillRef>
+          <a:effectRef idx="0">
+            <a:schemeClr val="accent1"/>
+          </a:effectRef>
+          <a:fontRef idx="minor">
+            <a:schemeClr val="lt1"/>
+          </a:fontRef>
+        </p:style>
+        <p:txBody>
+          <a:bodyPr rtlCol="0" anchor="ctr"/>
+          <a:lstStyle/>
+          <a:p>
+            <a:pPr algn="ctr"/>
+            <a:endParaRPr lang="en-US"/>
+          </a:p>
+        </p:txBody>
+      </p:sp>
+      <p:sp>
+        <p:nvSpPr>
+          <p:cNvPr id="5" name="Título 1">
+            <a:extLst>
+              <a:ext uri="{FF2B5EF4-FFF2-40B4-BE49-F238E27FC236}">
+                <a16:creationId xmlns:a16="http://schemas.microsoft.com/office/drawing/2014/main" id="{6F83A176-CCB3-44E4-98A2-FD8160389C2D}"/>
+              </a:ext>
+            </a:extLst>
+          </p:cNvPr>
+          <p:cNvSpPr>
+            <a:spLocks noGrp="1"/>
+          </p:cNvSpPr>
+          <p:nvPr>
+            <p:ph type="title"/>
+          </p:nvPr>
+        </p:nvSpPr>
+        <p:spPr>
+          <a:xfrm>
+            <a:off x="756138" y="174032"/>
+            <a:ext cx="7631723" cy="1111843"/>
+          </a:xfrm>
+        </p:spPr>
+        <p:txBody>
+          <a:bodyPr anchor="ctr">
+            <a:normAutofit/>
+          </a:bodyPr>
+          <a:lstStyle/>
+          <a:p>
+            <a:pPr algn="ctr"/>
+            <a:r>
+              <a:rPr lang="pt-BR" sz="3500"/>
+              <a:t>Próximos passos </a:t>
+            </a:r>
+          </a:p>
+        </p:txBody>
+      </p:sp>
+      <p:sp>
+        <p:nvSpPr>
+          <p:cNvPr id="6" name="Espaço Reservado para Conteúdo 2">
+            <a:extLst>
+              <a:ext uri="{FF2B5EF4-FFF2-40B4-BE49-F238E27FC236}">
+                <a16:creationId xmlns:a16="http://schemas.microsoft.com/office/drawing/2014/main" id="{EC50AF50-8CB7-4F6B-892C-713F0098E935}"/>
+              </a:ext>
+            </a:extLst>
+          </p:cNvPr>
+          <p:cNvSpPr>
+            <a:spLocks noGrp="1"/>
+          </p:cNvSpPr>
+          <p:nvPr>
+            <p:ph idx="1"/>
+          </p:nvPr>
+        </p:nvSpPr>
+        <p:spPr>
+          <a:xfrm>
+            <a:off x="756138" y="1459907"/>
+            <a:ext cx="7631722" cy="767904"/>
+          </a:xfrm>
+        </p:spPr>
+        <p:txBody>
+          <a:bodyPr anchor="ctr">
+            <a:normAutofit/>
+          </a:bodyPr>
+          <a:lstStyle/>
+          <a:p>
+            <a:pPr algn="ctr"/>
+            <a:endParaRPr lang="pt-BR" sz="1700"/>
+          </a:p>
+          <a:p>
+            <a:pPr algn="ctr"/>
+            <a:endParaRPr lang="pt-BR" sz="1700"/>
+          </a:p>
+        </p:txBody>
+      </p:sp>
+      <p:pic>
+        <p:nvPicPr>
+          <p:cNvPr id="7" name="Imagem 6">
+            <a:extLst>
+              <a:ext uri="{FF2B5EF4-FFF2-40B4-BE49-F238E27FC236}">
+                <a16:creationId xmlns:a16="http://schemas.microsoft.com/office/drawing/2014/main" id="{49B47876-180A-45DF-8A40-7F52B06B46B4}"/>
+              </a:ext>
+            </a:extLst>
+          </p:cNvPr>
+          <p:cNvPicPr>
+            <a:picLocks noChangeAspect="1"/>
+          </p:cNvPicPr>
+          <p:nvPr/>
+        </p:nvPicPr>
+        <p:blipFill>
+          <a:blip r:embed="rId2"/>
+          <a:stretch>
+            <a:fillRect/>
+          </a:stretch>
+        </p:blipFill>
+        <p:spPr>
+          <a:xfrm>
+            <a:off x="0" y="1875753"/>
+            <a:ext cx="9141714" cy="3882109"/>
+          </a:xfrm>
+          <a:prstGeom prst="rect">
+            <a:avLst/>
+          </a:prstGeom>
+        </p:spPr>
+      </p:pic>
+    </p:spTree>
+    <p:extLst>
+      <p:ext uri="{BB962C8B-B14F-4D97-AF65-F5344CB8AC3E}">
+        <p14:creationId xmlns:p14="http://schemas.microsoft.com/office/powerpoint/2010/main" val="2799224873"/>
       </p:ext>
     </p:extLst>
   </p:cSld>

</xml_diff>

<commit_message>
Atualização de slide de finalização
</commit_message>
<xml_diff>
--- a/Apresentação/Apresentação.pptx
+++ b/Apresentação/Apresentação.pptx
@@ -3212,7 +3212,7 @@
         </p:nvSpPr>
         <p:spPr>
           <a:xfrm>
-            <a:off x="487836" y="4559523"/>
+            <a:off x="487836" y="4692045"/>
             <a:ext cx="8176104" cy="1236440"/>
           </a:xfrm>
           <a:noFill/>
@@ -3225,47 +3225,20 @@
           <a:p>
             <a:pPr algn="ctr"/>
             <a:r>
-              <a:rPr lang="en-US" sz="5700"/>
-              <a:t>Obrigado a todos!</a:t>
-            </a:r>
-          </a:p>
-        </p:txBody>
-      </p:sp>
-      <p:sp>
-        <p:nvSpPr>
-          <p:cNvPr id="5" name="Espaço Reservado para Conteúdo 2">
-            <a:extLst>
-              <a:ext uri="{FF2B5EF4-FFF2-40B4-BE49-F238E27FC236}">
-                <a16:creationId xmlns:a16="http://schemas.microsoft.com/office/drawing/2014/main" id="{6F086EED-159E-492E-9710-E7BEBF55D8FE}"/>
-              </a:ext>
-            </a:extLst>
-          </p:cNvPr>
-          <p:cNvSpPr>
-            <a:spLocks noGrp="1"/>
-          </p:cNvSpPr>
-          <p:nvPr>
-            <p:ph idx="1"/>
-          </p:nvPr>
-        </p:nvSpPr>
-        <p:spPr>
-          <a:xfrm>
-            <a:off x="487836" y="5795963"/>
-            <a:ext cx="8176104" cy="560388"/>
-          </a:xfrm>
-          <a:noFill/>
-        </p:spPr>
-        <p:txBody>
-          <a:bodyPr vert="horz" lIns="91440" tIns="45720" rIns="91440" bIns="45720" rtlCol="0">
-            <a:normAutofit/>
-          </a:bodyPr>
-          <a:lstStyle/>
-          <a:p>
-            <a:pPr marL="0" indent="0" algn="ctr">
-              <a:buNone/>
-            </a:pPr>
-            <a:r>
-              <a:rPr lang="en-US" sz="2400"/>
-              <a:t>Alguma dúvida?</a:t>
+              <a:rPr lang="en-US" sz="5700" dirty="0" err="1"/>
+              <a:t>Obrigado</a:t>
+            </a:r>
+            <a:r>
+              <a:rPr lang="en-US" sz="5700" dirty="0"/>
+              <a:t> a </a:t>
+            </a:r>
+            <a:r>
+              <a:rPr lang="en-US" sz="5700" dirty="0" err="1"/>
+              <a:t>todos</a:t>
+            </a:r>
+            <a:r>
+              <a:rPr lang="en-US" sz="5700" dirty="0"/>
+              <a:t>!</a:t>
             </a:r>
           </a:p>
         </p:txBody>

</xml_diff>

<commit_message>
Uma correçãozinha de nada. Nada mesmo!
</commit_message>
<xml_diff>
--- a/Apresentação/Apresentação.pptx
+++ b/Apresentação/Apresentação.pptx
@@ -3896,7 +3896,23 @@
                   <a:srgbClr val="4F3727"/>
                 </a:solidFill>
               </a:rPr>
-              <a:t>M.E.R. (Modelo Entidade Relacionamento)– Banco de Dados</a:t>
+              <a:t>M.E.R. (Modelo Entidade </a:t>
+            </a:r>
+            <a:r>
+              <a:rPr lang="pt-BR" sz="2000" b="1">
+                <a:solidFill>
+                  <a:srgbClr val="4F3727"/>
+                </a:solidFill>
+              </a:rPr>
+              <a:t>Relacionamento) - </a:t>
+            </a:r>
+            <a:r>
+              <a:rPr lang="pt-BR" sz="2000" b="1" dirty="0">
+                <a:solidFill>
+                  <a:srgbClr val="4F3727"/>
+                </a:solidFill>
+              </a:rPr>
+              <a:t>Banco de Dados</a:t>
             </a:r>
           </a:p>
         </p:txBody>

</xml_diff>